<commit_message>
updates to Week 4
</commit_message>
<xml_diff>
--- a/week-4/W4-S1-JavaScript/W4-S1-JavaScript.pptx
+++ b/week-4/W4-S1-JavaScript/W4-S1-JavaScript.pptx
@@ -453,7 +453,7 @@
           <a:p>
             <a:fld id="{AA884A5F-B9F5-9B43-BE5B-EBBCD5646595}" type="datetimeFigureOut">
               <a:rPr lang="en-US" smtClean="0"/>
-              <a:t>9/30/24</a:t>
+              <a:t>10/7/24</a:t>
             </a:fld>
             <a:endParaRPr lang="en-US"/>
           </a:p>
@@ -1374,7 +1374,7 @@
           <a:p>
             <a:fld id="{F6FA2B21-3FCD-4721-B95C-427943F61125}" type="datetime1">
               <a:rPr lang="en-US" smtClean="0"/>
-              <a:t>9/30/24</a:t>
+              <a:t>10/7/24</a:t>
             </a:fld>
             <a:endParaRPr lang="en-US"/>
           </a:p>
@@ -1637,7 +1637,7 @@
           <a:p>
             <a:fld id="{F6FA2B21-3FCD-4721-B95C-427943F61125}" type="datetime1">
               <a:rPr lang="en-US" smtClean="0"/>
-              <a:t>9/30/24</a:t>
+              <a:t>10/7/24</a:t>
             </a:fld>
             <a:endParaRPr lang="en-US"/>
           </a:p>
@@ -1873,7 +1873,7 @@
           <a:p>
             <a:fld id="{F6FA2B21-3FCD-4721-B95C-427943F61125}" type="datetime1">
               <a:rPr lang="en-US" smtClean="0"/>
-              <a:t>9/30/24</a:t>
+              <a:t>10/7/24</a:t>
             </a:fld>
             <a:endParaRPr lang="en-US"/>
           </a:p>
@@ -2201,7 +2201,7 @@
           <a:p>
             <a:fld id="{EA0C0817-A112-4847-8014-A94B7D2A4EA3}" type="datetime1">
               <a:rPr lang="en-US" smtClean="0"/>
-              <a:t>9/30/24</a:t>
+              <a:t>10/7/24</a:t>
             </a:fld>
             <a:endParaRPr lang="en-US" dirty="0"/>
           </a:p>
@@ -2515,7 +2515,7 @@
           <a:p>
             <a:fld id="{7332B432-ACDA-4023-A761-2BAB76577B62}" type="datetime1">
               <a:rPr lang="en-US" smtClean="0"/>
-              <a:t>9/30/24</a:t>
+              <a:t>10/7/24</a:t>
             </a:fld>
             <a:endParaRPr lang="en-US"/>
           </a:p>
@@ -2822,7 +2822,7 @@
           <a:p>
             <a:fld id="{D9C646AA-F36E-4540-911D-FFFC0A0EF24A}" type="datetime1">
               <a:rPr lang="en-US" smtClean="0"/>
-              <a:t>9/30/24</a:t>
+              <a:t>10/7/24</a:t>
             </a:fld>
             <a:endParaRPr lang="en-US" dirty="0"/>
           </a:p>
@@ -3124,7 +3124,7 @@
           <a:p>
             <a:fld id="{69186D26-FA5F-4637-B602-B7C2DC34CFD4}" type="datetime1">
               <a:rPr lang="en-US" smtClean="0"/>
-              <a:t>9/30/24</a:t>
+              <a:t>10/7/24</a:t>
             </a:fld>
             <a:endParaRPr lang="en-US"/>
           </a:p>
@@ -3546,7 +3546,7 @@
           <a:p>
             <a:fld id="{8A7F15D8-96D1-4781-BC50-CA8A088B2FE4}" type="datetime1">
               <a:rPr lang="en-US" smtClean="0"/>
-              <a:t>9/30/24</a:t>
+              <a:t>10/7/24</a:t>
             </a:fld>
             <a:endParaRPr lang="en-US"/>
           </a:p>
@@ -3708,7 +3708,7 @@
           <a:p>
             <a:fld id="{F9A96C99-B8F8-4528-BD05-0E16E943DC09}" type="datetime1">
               <a:rPr lang="en-US" smtClean="0"/>
-              <a:t>9/30/24</a:t>
+              <a:t>10/7/24</a:t>
             </a:fld>
             <a:endParaRPr lang="en-US"/>
           </a:p>
@@ -3803,7 +3803,7 @@
           <a:p>
             <a:fld id="{03636942-C211-4B28-8DBD-C953E00AF71B}" type="datetime1">
               <a:rPr lang="en-US" smtClean="0"/>
-              <a:t>9/30/24</a:t>
+              <a:t>10/7/24</a:t>
             </a:fld>
             <a:endParaRPr lang="en-US"/>
           </a:p>
@@ -4181,7 +4181,7 @@
           <a:p>
             <a:fld id="{7E8D12A6-918A-48BD-8CB9-CA713993B0EA}" type="datetime1">
               <a:rPr lang="en-US" smtClean="0"/>
-              <a:t>9/30/24</a:t>
+              <a:t>10/7/24</a:t>
             </a:fld>
             <a:endParaRPr lang="en-US"/>
           </a:p>
@@ -4470,7 +4470,7 @@
           <a:p>
             <a:fld id="{F6FA2B21-3FCD-4721-B95C-427943F61125}" type="datetime1">
               <a:rPr lang="en-US" smtClean="0"/>
-              <a:t>9/30/24</a:t>
+              <a:t>10/7/24</a:t>
             </a:fld>
             <a:endParaRPr lang="en-US"/>
           </a:p>
@@ -4682,7 +4682,7 @@
           <a:p>
             <a:fld id="{F6FA2B21-3FCD-4721-B95C-427943F61125}" type="datetime1">
               <a:rPr lang="en-US" smtClean="0"/>
-              <a:t>9/30/24</a:t>
+              <a:t>10/7/24</a:t>
             </a:fld>
             <a:endParaRPr lang="en-US"/>
           </a:p>

</xml_diff>